<commit_message>
changed the presentation, added an extra data set
</commit_message>
<xml_diff>
--- a/Presentation/Bayesian Classifiers in Python.pptx
+++ b/Presentation/Bayesian Classifiers in Python.pptx
@@ -5,10 +5,10 @@
     <p:sldMasterId id="2147483648" r:id="rId1"/>
   </p:sldMasterIdLst>
   <p:notesMasterIdLst>
-    <p:notesMasterId r:id="rId22"/>
+    <p:notesMasterId r:id="rId25"/>
   </p:notesMasterIdLst>
   <p:handoutMasterIdLst>
-    <p:handoutMasterId r:id="rId23"/>
+    <p:handoutMasterId r:id="rId26"/>
   </p:handoutMasterIdLst>
   <p:sldIdLst>
     <p:sldId id="259" r:id="rId2"/>
@@ -31,6 +31,9 @@
     <p:sldId id="274" r:id="rId19"/>
     <p:sldId id="277" r:id="rId20"/>
     <p:sldId id="279" r:id="rId21"/>
+    <p:sldId id="281" r:id="rId22"/>
+    <p:sldId id="282" r:id="rId23"/>
+    <p:sldId id="283" r:id="rId24"/>
   </p:sldIdLst>
   <p:sldSz cx="9144000" cy="6858000" type="screen4x3"/>
   <p:notesSz cx="6858000" cy="9144000"/>
@@ -174,6 +177,9 @@
             <p14:sldId id="274"/>
             <p14:sldId id="277"/>
             <p14:sldId id="279"/>
+            <p14:sldId id="281"/>
+            <p14:sldId id="282"/>
+            <p14:sldId id="283"/>
           </p14:sldIdLst>
         </p14:section>
         <p14:section name="Appendix" id="{3F78B471-41DA-46F2-A8E4-97E471896AB3}">
@@ -5363,19 +5369,7 @@
             </a:pPr>
             <a:r>
               <a:rPr lang="en-US" dirty="0" smtClean="0"/>
-              <a:t>There are two football teams on </a:t>
-            </a:r>
-            <a:r>
-              <a:rPr lang="en-US" dirty="0" smtClean="0"/>
-              <a:t>TV </a:t>
-            </a:r>
-            <a:r>
-              <a:rPr lang="en-US" dirty="0" smtClean="0"/>
-              <a:t>today</a:t>
-            </a:r>
-            <a:r>
-              <a:rPr lang="en-US" dirty="0" smtClean="0"/>
-              <a:t>, the Chicago Bears and the Green Bay Packers. </a:t>
+              <a:t>There are two football teams on TV today, the Chicago Bears and the Green Bay Packers. </a:t>
             </a:r>
           </a:p>
           <a:p>
@@ -6685,11 +6679,7 @@
                     <a:p>
                       <a:r>
                         <a:rPr lang="en-US" sz="900" dirty="0" smtClean="0"/>
-                        <a:t>P(Small</a:t>
-                      </a:r>
-                      <a:r>
-                        <a:rPr lang="en-US" sz="900" dirty="0" smtClean="0"/>
-                        <a:t>)=</a:t>
+                        <a:t>P(Small)=</a:t>
                       </a:r>
                       <a:r>
                         <a:rPr lang="en-US" sz="900" baseline="0" dirty="0" smtClean="0"/>
@@ -6713,11 +6703,7 @@
                     <a:p>
                       <a:r>
                         <a:rPr lang="en-US" sz="900" dirty="0" smtClean="0"/>
-                        <a:t>P(Small)= 30</a:t>
-                      </a:r>
-                      <a:r>
-                        <a:rPr lang="en-US" sz="900" dirty="0" smtClean="0"/>
-                        <a:t>%</a:t>
+                        <a:t>P(Small)= 30%</a:t>
                       </a:r>
                     </a:p>
                     <a:p>
@@ -6789,11 +6775,7 @@
                       </a:r>
                       <a:r>
                         <a:rPr lang="en-US" sz="900" baseline="0" dirty="0" smtClean="0"/>
-                        <a:t> 10</a:t>
-                      </a:r>
-                      <a:r>
-                        <a:rPr lang="en-US" sz="900" baseline="0" dirty="0" smtClean="0"/>
-                        <a:t>%</a:t>
+                        <a:t> 10%</a:t>
                       </a:r>
                     </a:p>
                     <a:p>
@@ -6854,11 +6836,7 @@
                     <a:p>
                       <a:r>
                         <a:rPr lang="en-US" sz="900" dirty="0" smtClean="0"/>
-                        <a:t>P(Aloof</a:t>
-                      </a:r>
-                      <a:r>
-                        <a:rPr lang="en-US" sz="900" dirty="0" smtClean="0"/>
-                        <a:t>)= 60%</a:t>
+                        <a:t>P(Aloof)= 60%</a:t>
                       </a:r>
                     </a:p>
                     <a:p>
@@ -6886,11 +6864,7 @@
                       </a:r>
                       <a:r>
                         <a:rPr lang="en-US" sz="900" baseline="0" dirty="0" smtClean="0"/>
-                        <a:t> 10</a:t>
-                      </a:r>
-                      <a:r>
-                        <a:rPr lang="en-US" sz="900" baseline="0" dirty="0" smtClean="0"/>
-                        <a:t>%</a:t>
+                        <a:t> 10%</a:t>
                       </a:r>
                     </a:p>
                     <a:p>
@@ -6947,11 +6921,7 @@
                     <a:p>
                       <a:r>
                         <a:rPr lang="en-US" sz="900" dirty="0" smtClean="0"/>
-                        <a:t>P(Erect)=75</a:t>
-                      </a:r>
-                      <a:r>
-                        <a:rPr lang="en-US" sz="900" dirty="0" smtClean="0"/>
-                        <a:t>%</a:t>
+                        <a:t>P(Erect)=75%</a:t>
                       </a:r>
                     </a:p>
                     <a:p>
@@ -6996,11 +6966,7 @@
                       </a:r>
                       <a:r>
                         <a:rPr lang="en-US" sz="900" baseline="0" dirty="0" smtClean="0"/>
-                        <a:t> 40</a:t>
-                      </a:r>
-                      <a:r>
-                        <a:rPr lang="en-US" sz="900" baseline="0" dirty="0" smtClean="0"/>
-                        <a:t>%</a:t>
+                        <a:t> 40%</a:t>
                       </a:r>
                     </a:p>
                     <a:p>
@@ -7110,11 +7076,7 @@
                     <a:p>
                       <a:r>
                         <a:rPr lang="en-US" sz="900" dirty="0" smtClean="0"/>
-                        <a:t>P(Short)= 20</a:t>
-                      </a:r>
-                      <a:r>
-                        <a:rPr lang="en-US" sz="900" dirty="0" smtClean="0"/>
-                        <a:t>%</a:t>
+                        <a:t>P(Short)= 20%</a:t>
                       </a:r>
                     </a:p>
                     <a:p>
@@ -7147,7 +7109,6 @@
                         <a:rPr lang="en-US" sz="900" dirty="0" smtClean="0"/>
                         <a:t>%</a:t>
                       </a:r>
-                      <a:endParaRPr lang="en-US" sz="900" dirty="0" smtClean="0"/>
                     </a:p>
                   </a:txBody>
                   <a:tcPr/>
@@ -7488,11 +7449,7 @@
           <a:p>
             <a:r>
               <a:rPr lang="en-US" sz="3200" dirty="0" smtClean="0"/>
-              <a:t>Overview of Classification Problems: </a:t>
-            </a:r>
-            <a:r>
-              <a:rPr lang="en-US" sz="3200" dirty="0" smtClean="0"/>
-              <a:t>Definition</a:t>
+              <a:t>Overview of Classification Problems: Definition</a:t>
             </a:r>
             <a:endParaRPr lang="en-US" sz="3200" dirty="0"/>
           </a:p>
@@ -7858,15 +7815,7 @@
                             <a:srgbClr val="FF0000"/>
                           </a:solidFill>
                         </a:rPr>
-                        <a:t>P(Small</a:t>
-                      </a:r>
-                      <a:r>
-                        <a:rPr lang="en-US" sz="900" b="1" u="sng" dirty="0" smtClean="0">
-                          <a:solidFill>
-                            <a:srgbClr val="FF0000"/>
-                          </a:solidFill>
-                        </a:rPr>
-                        <a:t>)=</a:t>
+                        <a:t>P(Small)=</a:t>
                       </a:r>
                       <a:r>
                         <a:rPr lang="en-US" sz="900" b="1" u="sng" baseline="0" dirty="0" smtClean="0">
@@ -7898,15 +7847,7 @@
                             <a:srgbClr val="FF0000"/>
                           </a:solidFill>
                         </a:rPr>
-                        <a:t>P(Small)= 30</a:t>
-                      </a:r>
-                      <a:r>
-                        <a:rPr lang="en-US" sz="900" b="1" u="sng" dirty="0" smtClean="0">
-                          <a:solidFill>
-                            <a:srgbClr val="FF0000"/>
-                          </a:solidFill>
-                        </a:rPr>
-                        <a:t>%</a:t>
+                        <a:t>P(Small)= 30%</a:t>
                       </a:r>
                     </a:p>
                     <a:p>
@@ -7986,11 +7927,7 @@
                       </a:r>
                       <a:r>
                         <a:rPr lang="en-US" sz="900" baseline="0" dirty="0" smtClean="0"/>
-                        <a:t> 10</a:t>
-                      </a:r>
-                      <a:r>
-                        <a:rPr lang="en-US" sz="900" baseline="0" dirty="0" smtClean="0"/>
-                        <a:t>%</a:t>
+                        <a:t> 10%</a:t>
                       </a:r>
                     </a:p>
                     <a:p>
@@ -8067,11 +8004,7 @@
                     <a:p>
                       <a:r>
                         <a:rPr lang="en-US" sz="900" dirty="0" smtClean="0"/>
-                        <a:t>P(Aloof</a:t>
-                      </a:r>
-                      <a:r>
-                        <a:rPr lang="en-US" sz="900" dirty="0" smtClean="0"/>
-                        <a:t>)= 60%</a:t>
+                        <a:t>P(Aloof)= 60%</a:t>
                       </a:r>
                     </a:p>
                     <a:p>
@@ -8111,11 +8044,7 @@
                       </a:r>
                       <a:r>
                         <a:rPr lang="en-US" sz="900" baseline="0" dirty="0" smtClean="0"/>
-                        <a:t> 10</a:t>
-                      </a:r>
-                      <a:r>
-                        <a:rPr lang="en-US" sz="900" baseline="0" dirty="0" smtClean="0"/>
-                        <a:t>%</a:t>
+                        <a:t> 10%</a:t>
                       </a:r>
                     </a:p>
                     <a:p>
@@ -8184,11 +8113,7 @@
                     <a:p>
                       <a:r>
                         <a:rPr lang="en-US" sz="900" dirty="0" smtClean="0"/>
-                        <a:t>P(Erect)=75</a:t>
-                      </a:r>
-                      <a:r>
-                        <a:rPr lang="en-US" sz="900" dirty="0" smtClean="0"/>
-                        <a:t>%</a:t>
+                        <a:t>P(Erect)=75%</a:t>
                       </a:r>
                     </a:p>
                     <a:p>
@@ -8245,11 +8170,7 @@
                       </a:r>
                       <a:r>
                         <a:rPr lang="en-US" sz="900" baseline="0" dirty="0" smtClean="0"/>
-                        <a:t> 40</a:t>
-                      </a:r>
-                      <a:r>
-                        <a:rPr lang="en-US" sz="900" baseline="0" dirty="0" smtClean="0"/>
-                        <a:t>%</a:t>
+                        <a:t> 40%</a:t>
                       </a:r>
                     </a:p>
                     <a:p>
@@ -8387,11 +8308,7 @@
                     <a:p>
                       <a:r>
                         <a:rPr lang="en-US" sz="900" dirty="0" smtClean="0"/>
-                        <a:t>P(Short)= 20</a:t>
-                      </a:r>
-                      <a:r>
-                        <a:rPr lang="en-US" sz="900" dirty="0" smtClean="0"/>
-                        <a:t>%</a:t>
+                        <a:t>P(Short)= 20%</a:t>
                       </a:r>
                     </a:p>
                     <a:p>
@@ -8436,11 +8353,6 @@
                         </a:rPr>
                         <a:t>%</a:t>
                       </a:r>
-                      <a:endParaRPr lang="en-US" sz="900" b="1" u="sng" dirty="0" smtClean="0">
-                        <a:solidFill>
-                          <a:srgbClr val="FF0000"/>
-                        </a:solidFill>
-                      </a:endParaRPr>
                     </a:p>
                   </a:txBody>
                   <a:tcPr/>
@@ -9471,7 +9383,6 @@
               <a:rPr lang="en-US" dirty="0"/>
               <a:t> partition each time</a:t>
             </a:r>
-            <a:endParaRPr lang="en-US" dirty="0"/>
           </a:p>
         </p:txBody>
       </p:sp>
@@ -9791,7 +9702,7 @@
         </p:spPr>
         <p:txBody>
           <a:bodyPr>
-            <a:normAutofit fontScale="70000" lnSpcReduction="20000"/>
+            <a:normAutofit fontScale="62500" lnSpcReduction="20000"/>
           </a:bodyPr>
           <a:lstStyle/>
           <a:p>
@@ -9878,7 +9789,18 @@
             <a:pPr lvl="1"/>
             <a:r>
               <a:rPr lang="en-US" dirty="0" smtClean="0"/>
-              <a:t>Assessing Classifier Performance</a:t>
+              <a:t>Assessing Classifier </a:t>
+            </a:r>
+            <a:r>
+              <a:rPr lang="en-US" dirty="0" smtClean="0"/>
+              <a:t>Performance</a:t>
+            </a:r>
+          </a:p>
+          <a:p>
+            <a:pPr lvl="1"/>
+            <a:r>
+              <a:rPr lang="en-US" dirty="0" smtClean="0"/>
+              <a:t>Limitations of Bayesian Classifiers</a:t>
             </a:r>
             <a:endParaRPr lang="en-US" dirty="0"/>
           </a:p>
@@ -10120,6 +10042,429 @@
     <p:extLst>
       <p:ext uri="{BB962C8B-B14F-4D97-AF65-F5344CB8AC3E}">
         <p14:creationId xmlns:p14="http://schemas.microsoft.com/office/powerpoint/2010/main" val="1522195462"/>
+      </p:ext>
+    </p:extLst>
+  </p:cSld>
+  <p:clrMapOvr>
+    <a:masterClrMapping/>
+  </p:clrMapOvr>
+  <p:transition spd="slow">
+    <p:wipe dir="d"/>
+  </p:transition>
+</p:sld>
+</file>
+
+<file path=ppt/slides/slide21.xml><?xml version="1.0" encoding="utf-8"?>
+<p:sld xmlns:a="http://schemas.openxmlformats.org/drawingml/2006/main" xmlns:r="http://schemas.openxmlformats.org/officeDocument/2006/relationships" xmlns:p="http://schemas.openxmlformats.org/presentationml/2006/main">
+  <p:cSld>
+    <p:spTree>
+      <p:nvGrpSpPr>
+        <p:cNvPr id="1" name=""/>
+        <p:cNvGrpSpPr/>
+        <p:nvPr/>
+      </p:nvGrpSpPr>
+      <p:grpSpPr>
+        <a:xfrm>
+          <a:off x="0" y="0"/>
+          <a:ext cx="0" cy="0"/>
+          <a:chOff x="0" y="0"/>
+          <a:chExt cx="0" cy="0"/>
+        </a:xfrm>
+      </p:grpSpPr>
+      <p:sp>
+        <p:nvSpPr>
+          <p:cNvPr id="3" name="Content Placeholder 2"/>
+          <p:cNvSpPr>
+            <a:spLocks noGrp="1"/>
+          </p:cNvSpPr>
+          <p:nvPr>
+            <p:ph idx="1"/>
+          </p:nvPr>
+        </p:nvSpPr>
+        <p:spPr/>
+        <p:txBody>
+          <a:bodyPr/>
+          <a:lstStyle/>
+          <a:p>
+            <a:pPr marL="0" indent="0">
+              <a:buNone/>
+            </a:pPr>
+            <a:r>
+              <a:rPr lang="en-US" dirty="0" smtClean="0"/>
+              <a:t>Limitations of Bayesian Classifiers:</a:t>
+            </a:r>
+          </a:p>
+          <a:p>
+            <a:pPr marL="514350" indent="-514350">
+              <a:buAutoNum type="arabicPeriod"/>
+            </a:pPr>
+            <a:r>
+              <a:rPr lang="en-US" dirty="0" smtClean="0"/>
+              <a:t>Most rely on strict assumption of independence between variables (Naïve)</a:t>
+            </a:r>
+          </a:p>
+          <a:p>
+            <a:pPr marL="514350" indent="-514350">
+              <a:buAutoNum type="arabicPeriod"/>
+            </a:pPr>
+            <a:r>
+              <a:rPr lang="en-US" dirty="0" smtClean="0"/>
+              <a:t>Models that do not rely on independence assumption can be quite complex</a:t>
+            </a:r>
+            <a:endParaRPr lang="en-US" dirty="0"/>
+          </a:p>
+        </p:txBody>
+      </p:sp>
+      <p:sp>
+        <p:nvSpPr>
+          <p:cNvPr id="4" name="Title 1"/>
+          <p:cNvSpPr>
+            <a:spLocks noGrp="1"/>
+          </p:cNvSpPr>
+          <p:nvPr>
+            <p:ph type="title"/>
+          </p:nvPr>
+        </p:nvSpPr>
+        <p:spPr/>
+        <p:txBody>
+          <a:bodyPr>
+            <a:normAutofit/>
+          </a:bodyPr>
+          <a:lstStyle/>
+          <a:p>
+            <a:r>
+              <a:rPr lang="en-US" dirty="0"/>
+              <a:t>Illustrative </a:t>
+            </a:r>
+            <a:r>
+              <a:rPr lang="en-US" dirty="0" smtClean="0"/>
+              <a:t>Example</a:t>
+            </a:r>
+            <a:endParaRPr lang="en-US" dirty="0"/>
+          </a:p>
+        </p:txBody>
+      </p:sp>
+    </p:spTree>
+    <p:extLst>
+      <p:ext uri="{BB962C8B-B14F-4D97-AF65-F5344CB8AC3E}">
+        <p14:creationId xmlns:p14="http://schemas.microsoft.com/office/powerpoint/2010/main" val="249801804"/>
+      </p:ext>
+    </p:extLst>
+  </p:cSld>
+  <p:clrMapOvr>
+    <a:masterClrMapping/>
+  </p:clrMapOvr>
+  <p:transition spd="slow">
+    <p:wipe dir="d"/>
+  </p:transition>
+</p:sld>
+</file>
+
+<file path=ppt/slides/slide22.xml><?xml version="1.0" encoding="utf-8"?>
+<p:sld xmlns:a="http://schemas.openxmlformats.org/drawingml/2006/main" xmlns:r="http://schemas.openxmlformats.org/officeDocument/2006/relationships" xmlns:p="http://schemas.openxmlformats.org/presentationml/2006/main">
+  <p:cSld>
+    <p:spTree>
+      <p:nvGrpSpPr>
+        <p:cNvPr id="1" name=""/>
+        <p:cNvGrpSpPr/>
+        <p:nvPr/>
+      </p:nvGrpSpPr>
+      <p:grpSpPr>
+        <a:xfrm>
+          <a:off x="0" y="0"/>
+          <a:ext cx="0" cy="0"/>
+          <a:chOff x="0" y="0"/>
+          <a:chExt cx="0" cy="0"/>
+        </a:xfrm>
+      </p:grpSpPr>
+      <p:sp>
+        <p:nvSpPr>
+          <p:cNvPr id="3" name="Content Placeholder 2"/>
+          <p:cNvSpPr>
+            <a:spLocks noGrp="1"/>
+          </p:cNvSpPr>
+          <p:nvPr>
+            <p:ph idx="1"/>
+          </p:nvPr>
+        </p:nvSpPr>
+        <p:spPr>
+          <a:xfrm>
+            <a:off x="762000" y="5562600"/>
+            <a:ext cx="8077200" cy="1016976"/>
+          </a:xfrm>
+        </p:spPr>
+        <p:txBody>
+          <a:bodyPr/>
+          <a:lstStyle/>
+          <a:p>
+            <a:r>
+              <a:rPr lang="en-US" dirty="0" smtClean="0"/>
+              <a:t>X and Y coordinates are not independent</a:t>
+            </a:r>
+            <a:endParaRPr lang="en-US" dirty="0"/>
+          </a:p>
+        </p:txBody>
+      </p:sp>
+      <p:sp>
+        <p:nvSpPr>
+          <p:cNvPr id="4" name="Title 1"/>
+          <p:cNvSpPr>
+            <a:spLocks noGrp="1"/>
+          </p:cNvSpPr>
+          <p:nvPr>
+            <p:ph type="title"/>
+          </p:nvPr>
+        </p:nvSpPr>
+        <p:spPr/>
+        <p:txBody>
+          <a:bodyPr>
+            <a:normAutofit/>
+          </a:bodyPr>
+          <a:lstStyle/>
+          <a:p>
+            <a:r>
+              <a:rPr lang="en-US" dirty="0"/>
+              <a:t>Illustrative </a:t>
+            </a:r>
+            <a:r>
+              <a:rPr lang="en-US" dirty="0" smtClean="0"/>
+              <a:t>Example</a:t>
+            </a:r>
+            <a:endParaRPr lang="en-US" dirty="0"/>
+          </a:p>
+        </p:txBody>
+      </p:sp>
+      <p:pic>
+        <p:nvPicPr>
+          <p:cNvPr id="1026" name="Picture 2"/>
+          <p:cNvPicPr>
+            <a:picLocks noChangeAspect="1" noChangeArrowheads="1"/>
+          </p:cNvPicPr>
+          <p:nvPr/>
+        </p:nvPicPr>
+        <p:blipFill>
+          <a:blip r:embed="rId2" cstate="email">
+            <a:extLst>
+              <a:ext uri="{28A0092B-C50C-407E-A947-70E740481C1C}">
+                <a14:useLocalDpi xmlns:a14="http://schemas.microsoft.com/office/drawing/2010/main" val="0"/>
+              </a:ext>
+            </a:extLst>
+          </a:blip>
+          <a:srcRect/>
+          <a:stretch>
+            <a:fillRect/>
+          </a:stretch>
+        </p:blipFill>
+        <p:spPr bwMode="auto">
+          <a:xfrm>
+            <a:off x="2057400" y="1143000"/>
+            <a:ext cx="5257800" cy="4294627"/>
+          </a:xfrm>
+          <a:prstGeom prst="rect">
+            <a:avLst/>
+          </a:prstGeom>
+          <a:noFill/>
+          <a:ln>
+            <a:noFill/>
+          </a:ln>
+          <a:effectLst/>
+          <a:extLst>
+            <a:ext uri="{909E8E84-426E-40DD-AFC4-6F175D3DCCD1}">
+              <a14:hiddenFill xmlns:a14="http://schemas.microsoft.com/office/drawing/2010/main">
+                <a:solidFill>
+                  <a:schemeClr val="accent1"/>
+                </a:solidFill>
+              </a14:hiddenFill>
+            </a:ext>
+            <a:ext uri="{91240B29-F687-4F45-9708-019B960494DF}">
+              <a14:hiddenLine xmlns:a14="http://schemas.microsoft.com/office/drawing/2010/main" w="9525">
+                <a:solidFill>
+                  <a:schemeClr val="tx1"/>
+                </a:solidFill>
+                <a:miter lim="800000"/>
+                <a:headEnd/>
+                <a:tailEnd/>
+              </a14:hiddenLine>
+            </a:ext>
+            <a:ext uri="{AF507438-7753-43E0-B8FC-AC1667EBCBE1}">
+              <a14:hiddenEffects xmlns:a14="http://schemas.microsoft.com/office/drawing/2010/main">
+                <a:effectLst>
+                  <a:outerShdw dist="35921" dir="2700000" algn="ctr" rotWithShape="0">
+                    <a:schemeClr val="bg2"/>
+                  </a:outerShdw>
+                </a:effectLst>
+              </a14:hiddenEffects>
+            </a:ext>
+          </a:extLst>
+        </p:spPr>
+      </p:pic>
+    </p:spTree>
+    <p:extLst>
+      <p:ext uri="{BB962C8B-B14F-4D97-AF65-F5344CB8AC3E}">
+        <p14:creationId xmlns:p14="http://schemas.microsoft.com/office/powerpoint/2010/main" val="107562764"/>
+      </p:ext>
+    </p:extLst>
+  </p:cSld>
+  <p:clrMapOvr>
+    <a:masterClrMapping/>
+  </p:clrMapOvr>
+  <p:transition spd="slow">
+    <p:wipe dir="d"/>
+  </p:transition>
+</p:sld>
+</file>
+
+<file path=ppt/slides/slide23.xml><?xml version="1.0" encoding="utf-8"?>
+<p:sld xmlns:a="http://schemas.openxmlformats.org/drawingml/2006/main" xmlns:r="http://schemas.openxmlformats.org/officeDocument/2006/relationships" xmlns:p="http://schemas.openxmlformats.org/presentationml/2006/main">
+  <p:cSld>
+    <p:spTree>
+      <p:nvGrpSpPr>
+        <p:cNvPr id="1" name=""/>
+        <p:cNvGrpSpPr/>
+        <p:nvPr/>
+      </p:nvGrpSpPr>
+      <p:grpSpPr>
+        <a:xfrm>
+          <a:off x="0" y="0"/>
+          <a:ext cx="0" cy="0"/>
+          <a:chOff x="0" y="0"/>
+          <a:chExt cx="0" cy="0"/>
+        </a:xfrm>
+      </p:grpSpPr>
+      <p:sp>
+        <p:nvSpPr>
+          <p:cNvPr id="3" name="Content Placeholder 2"/>
+          <p:cNvSpPr>
+            <a:spLocks noGrp="1"/>
+          </p:cNvSpPr>
+          <p:nvPr>
+            <p:ph idx="1"/>
+          </p:nvPr>
+        </p:nvSpPr>
+        <p:spPr>
+          <a:xfrm>
+            <a:off x="762000" y="5917224"/>
+            <a:ext cx="8077200" cy="788376"/>
+          </a:xfrm>
+        </p:spPr>
+        <p:txBody>
+          <a:bodyPr/>
+          <a:lstStyle/>
+          <a:p>
+            <a:r>
+              <a:rPr lang="en-US" dirty="0" smtClean="0"/>
+              <a:t>Model performs </a:t>
+            </a:r>
+            <a:r>
+              <a:rPr lang="en-US" smtClean="0"/>
+              <a:t>very poorly </a:t>
+            </a:r>
+            <a:endParaRPr lang="en-US" dirty="0"/>
+          </a:p>
+        </p:txBody>
+      </p:sp>
+      <p:sp>
+        <p:nvSpPr>
+          <p:cNvPr id="4" name="Title 1"/>
+          <p:cNvSpPr>
+            <a:spLocks noGrp="1"/>
+          </p:cNvSpPr>
+          <p:nvPr>
+            <p:ph type="title"/>
+          </p:nvPr>
+        </p:nvSpPr>
+        <p:spPr>
+          <a:xfrm>
+            <a:off x="762000" y="269632"/>
+            <a:ext cx="8077200" cy="1143000"/>
+          </a:xfrm>
+        </p:spPr>
+        <p:txBody>
+          <a:bodyPr>
+            <a:normAutofit/>
+          </a:bodyPr>
+          <a:lstStyle/>
+          <a:p>
+            <a:r>
+              <a:rPr lang="en-US" dirty="0"/>
+              <a:t>Illustrative </a:t>
+            </a:r>
+            <a:r>
+              <a:rPr lang="en-US" dirty="0" smtClean="0"/>
+              <a:t>Example</a:t>
+            </a:r>
+            <a:endParaRPr lang="en-US" dirty="0"/>
+          </a:p>
+        </p:txBody>
+      </p:sp>
+      <p:pic>
+        <p:nvPicPr>
+          <p:cNvPr id="2050" name="Picture 2"/>
+          <p:cNvPicPr>
+            <a:picLocks noChangeAspect="1" noChangeArrowheads="1"/>
+          </p:cNvPicPr>
+          <p:nvPr/>
+        </p:nvPicPr>
+        <p:blipFill>
+          <a:blip r:embed="rId2" cstate="email">
+            <a:extLst>
+              <a:ext uri="{28A0092B-C50C-407E-A947-70E740481C1C}">
+                <a14:useLocalDpi xmlns:a14="http://schemas.microsoft.com/office/drawing/2010/main" val="0"/>
+              </a:ext>
+            </a:extLst>
+          </a:blip>
+          <a:srcRect/>
+          <a:stretch>
+            <a:fillRect/>
+          </a:stretch>
+        </p:blipFill>
+        <p:spPr bwMode="auto">
+          <a:xfrm>
+            <a:off x="1924050" y="1219200"/>
+            <a:ext cx="5529828" cy="4516823"/>
+          </a:xfrm>
+          <a:prstGeom prst="rect">
+            <a:avLst/>
+          </a:prstGeom>
+          <a:noFill/>
+          <a:ln>
+            <a:noFill/>
+          </a:ln>
+          <a:effectLst/>
+          <a:extLst>
+            <a:ext uri="{909E8E84-426E-40DD-AFC4-6F175D3DCCD1}">
+              <a14:hiddenFill xmlns:a14="http://schemas.microsoft.com/office/drawing/2010/main">
+                <a:solidFill>
+                  <a:schemeClr val="accent1"/>
+                </a:solidFill>
+              </a14:hiddenFill>
+            </a:ext>
+            <a:ext uri="{91240B29-F687-4F45-9708-019B960494DF}">
+              <a14:hiddenLine xmlns:a14="http://schemas.microsoft.com/office/drawing/2010/main" w="9525">
+                <a:solidFill>
+                  <a:schemeClr val="tx1"/>
+                </a:solidFill>
+                <a:miter lim="800000"/>
+                <a:headEnd/>
+                <a:tailEnd/>
+              </a14:hiddenLine>
+            </a:ext>
+            <a:ext uri="{AF507438-7753-43E0-B8FC-AC1667EBCBE1}">
+              <a14:hiddenEffects xmlns:a14="http://schemas.microsoft.com/office/drawing/2010/main">
+                <a:effectLst>
+                  <a:outerShdw dist="35921" dir="2700000" algn="ctr" rotWithShape="0">
+                    <a:schemeClr val="bg2"/>
+                  </a:outerShdw>
+                </a:effectLst>
+              </a14:hiddenEffects>
+            </a:ext>
+          </a:extLst>
+        </p:spPr>
+      </p:pic>
+    </p:spTree>
+    <p:extLst>
+      <p:ext uri="{BB962C8B-B14F-4D97-AF65-F5344CB8AC3E}">
+        <p14:creationId xmlns:p14="http://schemas.microsoft.com/office/powerpoint/2010/main" val="2710854922"/>
       </p:ext>
     </p:extLst>
   </p:cSld>

</xml_diff>